<commit_message>
Added footer on slide; Updated log charts
</commit_message>
<xml_diff>
--- a/Widescreen.pptx
+++ b/Widescreen.pptx
@@ -384,10 +384,10 @@
           </a:lstStyle>
           <a:p>
             <a:r>
-              <a:rPr lang="en-GB"/>
+              <a:rPr lang="en-GB" dirty="0"/>
               <a:t>Click to edit Master title style</a:t>
             </a:r>
-            <a:endParaRPr lang="en-US"/>
+            <a:endParaRPr lang="en-US" dirty="0"/>
           </a:p>
         </p:txBody>
       </p:sp>
@@ -455,10 +455,10 @@
           </a:lstStyle>
           <a:p>
             <a:r>
-              <a:rPr lang="en-GB"/>
+              <a:rPr lang="en-GB" dirty="0"/>
               <a:t>Click to edit Master subtitle style</a:t>
             </a:r>
-            <a:endParaRPr lang="en-US"/>
+            <a:endParaRPr lang="en-US" dirty="0"/>
           </a:p>
         </p:txBody>
       </p:sp>
@@ -493,7 +493,7 @@
           <a:p>
             <a:fld id="{02BBDFB6-836B-2F4C-8F2E-A718E053163E}" type="datetimeFigureOut">
               <a:rPr lang="en-US" smtClean="0"/>
-              <a:t>5/22/20</a:t>
+              <a:t>6/6/20</a:t>
             </a:fld>
             <a:endParaRPr lang="en-US"/>
           </a:p>
@@ -528,7 +528,7 @@
           <a:bodyPr/>
           <a:lstStyle/>
           <a:p>
-            <a:endParaRPr lang="en-US"/>
+            <a:endParaRPr lang="en-US" dirty="0"/>
           </a:p>
         </p:txBody>
       </p:sp>
@@ -583,7 +583,7 @@
 </file>
 
 <file path=ppt/slideLayouts/slideLayout2.xml><?xml version="1.0" encoding="utf-8"?>
-<p:sldLayout xmlns:a="http://schemas.openxmlformats.org/drawingml/2006/main" xmlns:r="http://schemas.openxmlformats.org/officeDocument/2006/relationships" xmlns:p="http://schemas.openxmlformats.org/presentationml/2006/main" type="obj" preserve="1">
+<p:sldLayout xmlns:a="http://schemas.openxmlformats.org/drawingml/2006/main" xmlns:r="http://schemas.openxmlformats.org/officeDocument/2006/relationships" xmlns:p="http://schemas.openxmlformats.org/presentationml/2006/main" preserve="1" userDrawn="1">
   <p:cSld name="Title and Content">
     <p:spTree>
       <p:nvGrpSpPr>
@@ -691,6 +691,52 @@
           </a:p>
         </p:txBody>
       </p:sp>
+      <p:sp>
+        <p:nvSpPr>
+          <p:cNvPr id="4" name="Text Placeholder 4">
+            <a:extLst>
+              <a:ext uri="{FF2B5EF4-FFF2-40B4-BE49-F238E27FC236}">
+                <a16:creationId xmlns:a16="http://schemas.microsoft.com/office/drawing/2014/main" id="{B51C8796-6B26-CC41-971D-48A819E6AB70}"/>
+              </a:ext>
+            </a:extLst>
+          </p:cNvPr>
+          <p:cNvSpPr>
+            <a:spLocks noGrp="1"/>
+          </p:cNvSpPr>
+          <p:nvPr>
+            <p:ph type="body" sz="quarter" idx="10" hasCustomPrompt="1"/>
+          </p:nvPr>
+        </p:nvSpPr>
+        <p:spPr>
+          <a:xfrm>
+            <a:off x="178800" y="6678000"/>
+            <a:ext cx="11834398" cy="180001"/>
+          </a:xfrm>
+        </p:spPr>
+        <p:txBody>
+          <a:bodyPr>
+            <a:noAutofit/>
+          </a:bodyPr>
+          <a:lstStyle>
+            <a:lvl1pPr marL="0" indent="0" algn="r">
+              <a:buNone/>
+              <a:defRPr sz="1200">
+                <a:solidFill>
+                  <a:schemeClr val="accent3"/>
+                </a:solidFill>
+                <a:latin typeface="+mn-lt"/>
+              </a:defRPr>
+            </a:lvl1pPr>
+          </a:lstStyle>
+          <a:p>
+            <a:pPr lvl="0"/>
+            <a:r>
+              <a:rPr lang="en-US" dirty="0"/>
+              <a:t>Click to edit footer style</a:t>
+            </a:r>
+          </a:p>
+        </p:txBody>
+      </p:sp>
     </p:spTree>
     <p:extLst>
       <p:ext uri="{BB962C8B-B14F-4D97-AF65-F5344CB8AC3E}">
@@ -705,7 +751,7 @@
 </file>
 
 <file path=ppt/slideLayouts/slideLayout3.xml><?xml version="1.0" encoding="utf-8"?>
-<p:sldLayout xmlns:a="http://schemas.openxmlformats.org/drawingml/2006/main" xmlns:r="http://schemas.openxmlformats.org/officeDocument/2006/relationships" xmlns:p="http://schemas.openxmlformats.org/presentationml/2006/main" type="obj" preserve="1">
+<p:sldLayout xmlns:a="http://schemas.openxmlformats.org/drawingml/2006/main" xmlns:r="http://schemas.openxmlformats.org/officeDocument/2006/relationships" xmlns:p="http://schemas.openxmlformats.org/presentationml/2006/main" preserve="1" userDrawn="1">
   <p:cSld name="Title and Max Content">
     <p:spTree>
       <p:nvGrpSpPr>
@@ -778,38 +824,84 @@
           <a:p>
             <a:pPr lvl="0"/>
             <a:r>
-              <a:rPr lang="en-GB"/>
+              <a:rPr lang="en-GB" dirty="0"/>
               <a:t>Click to edit Master text styles</a:t>
             </a:r>
           </a:p>
           <a:p>
             <a:pPr lvl="1"/>
             <a:r>
-              <a:rPr lang="en-GB"/>
+              <a:rPr lang="en-GB" dirty="0"/>
               <a:t>Second level</a:t>
             </a:r>
           </a:p>
           <a:p>
             <a:pPr lvl="2"/>
             <a:r>
-              <a:rPr lang="en-GB"/>
+              <a:rPr lang="en-GB" dirty="0"/>
               <a:t>Third level</a:t>
             </a:r>
           </a:p>
           <a:p>
             <a:pPr lvl="3"/>
             <a:r>
-              <a:rPr lang="en-GB"/>
+              <a:rPr lang="en-GB" dirty="0"/>
               <a:t>Fourth level</a:t>
             </a:r>
           </a:p>
           <a:p>
             <a:pPr lvl="4"/>
             <a:r>
-              <a:rPr lang="en-GB"/>
+              <a:rPr lang="en-GB" dirty="0"/>
               <a:t>Fifth level</a:t>
             </a:r>
-            <a:endParaRPr lang="en-US"/>
+            <a:endParaRPr lang="en-US" dirty="0"/>
+          </a:p>
+        </p:txBody>
+      </p:sp>
+      <p:sp>
+        <p:nvSpPr>
+          <p:cNvPr id="5" name="Text Placeholder 4">
+            <a:extLst>
+              <a:ext uri="{FF2B5EF4-FFF2-40B4-BE49-F238E27FC236}">
+                <a16:creationId xmlns:a16="http://schemas.microsoft.com/office/drawing/2014/main" id="{C9B61346-A526-8543-A9DD-2527BCF7EB02}"/>
+              </a:ext>
+            </a:extLst>
+          </p:cNvPr>
+          <p:cNvSpPr>
+            <a:spLocks noGrp="1"/>
+          </p:cNvSpPr>
+          <p:nvPr>
+            <p:ph type="body" sz="quarter" idx="10" hasCustomPrompt="1"/>
+          </p:nvPr>
+        </p:nvSpPr>
+        <p:spPr>
+          <a:xfrm>
+            <a:off x="178800" y="6678000"/>
+            <a:ext cx="11834398" cy="180001"/>
+          </a:xfrm>
+        </p:spPr>
+        <p:txBody>
+          <a:bodyPr>
+            <a:noAutofit/>
+          </a:bodyPr>
+          <a:lstStyle>
+            <a:lvl1pPr marL="0" indent="0" algn="r">
+              <a:buNone/>
+              <a:defRPr sz="1200">
+                <a:solidFill>
+                  <a:schemeClr val="accent3"/>
+                </a:solidFill>
+                <a:latin typeface="+mn-lt"/>
+              </a:defRPr>
+            </a:lvl1pPr>
+          </a:lstStyle>
+          <a:p>
+            <a:pPr lvl="0"/>
+            <a:r>
+              <a:rPr lang="en-US" dirty="0"/>
+              <a:t>Click to edit footer style</a:t>
+            </a:r>
           </a:p>
         </p:txBody>
       </p:sp>
@@ -996,7 +1088,7 @@
           <a:p>
             <a:fld id="{02BBDFB6-836B-2F4C-8F2E-A718E053163E}" type="datetimeFigureOut">
               <a:rPr lang="en-US" smtClean="0"/>
-              <a:t>5/22/20</a:t>
+              <a:t>6/6/20</a:t>
             </a:fld>
             <a:endParaRPr lang="en-US"/>
           </a:p>

</xml_diff>